<commit_message>
adding some page to mid-term seminar
</commit_message>
<xml_diff>
--- a/Midterm-Seminar/Seminar_NextJS.pptx
+++ b/Midterm-Seminar/Seminar_NextJS.pptx
@@ -5,7 +5,7 @@
     <p:sldMasterId id="2147483703" r:id="rId1"/>
   </p:sldMasterIdLst>
   <p:notesMasterIdLst>
-    <p:notesMasterId r:id="rId29"/>
+    <p:notesMasterId r:id="rId32"/>
   </p:notesMasterIdLst>
   <p:sldIdLst>
     <p:sldId id="256" r:id="rId2"/>
@@ -32,34 +32,37 @@
     <p:sldId id="356" r:id="rId23"/>
     <p:sldId id="357" r:id="rId24"/>
     <p:sldId id="367" r:id="rId25"/>
-    <p:sldId id="296" r:id="rId26"/>
-    <p:sldId id="326" r:id="rId27"/>
-    <p:sldId id="368" r:id="rId28"/>
+    <p:sldId id="369" r:id="rId26"/>
+    <p:sldId id="370" r:id="rId27"/>
+    <p:sldId id="371" r:id="rId28"/>
+    <p:sldId id="296" r:id="rId29"/>
+    <p:sldId id="326" r:id="rId30"/>
+    <p:sldId id="368" r:id="rId31"/>
   </p:sldIdLst>
   <p:sldSz cx="9144000" cy="5143500" type="screen16x9"/>
   <p:notesSz cx="6858000" cy="9144000"/>
   <p:embeddedFontLst>
     <p:embeddedFont>
       <p:font typeface="Merriweather Light" panose="00000400000000000000" pitchFamily="2" charset="0"/>
-      <p:regular r:id="rId30"/>
-      <p:bold r:id="rId31"/>
-      <p:italic r:id="rId32"/>
-      <p:boldItalic r:id="rId33"/>
+      <p:regular r:id="rId33"/>
+      <p:bold r:id="rId34"/>
+      <p:italic r:id="rId35"/>
+      <p:boldItalic r:id="rId36"/>
     </p:embeddedFont>
     <p:embeddedFont>
       <p:font typeface="Montserrat" panose="00000500000000000000" pitchFamily="2" charset="0"/>
-      <p:regular r:id="rId34"/>
-      <p:bold r:id="rId35"/>
-      <p:italic r:id="rId36"/>
-      <p:boldItalic r:id="rId37"/>
+      <p:regular r:id="rId37"/>
+      <p:bold r:id="rId38"/>
+      <p:italic r:id="rId39"/>
+      <p:boldItalic r:id="rId40"/>
     </p:embeddedFont>
     <p:embeddedFont>
       <p:font typeface="Vidaloka" panose="020B0604020202020204" charset="0"/>
-      <p:regular r:id="rId38"/>
+      <p:regular r:id="rId41"/>
     </p:embeddedFont>
     <p:embeddedFont>
       <p:font typeface="Wingdings 2" panose="05020102010507070707" pitchFamily="18" charset="2"/>
-      <p:regular r:id="rId39"/>
+      <p:regular r:id="rId42"/>
     </p:embeddedFont>
   </p:embeddedFontLst>
   <p:defaultTextStyle>
@@ -4820,6 +4823,67 @@
 </file>
 
 <file path=ppt/notesSlides/notesSlide25.xml><?xml version="1.0" encoding="utf-8"?>
+<p:notes xmlns:a="http://schemas.openxmlformats.org/drawingml/2006/main" xmlns:r="http://schemas.openxmlformats.org/officeDocument/2006/relationships" xmlns:p="http://schemas.openxmlformats.org/presentationml/2006/main">
+  <p:cSld>
+    <p:spTree>
+      <p:nvGrpSpPr>
+        <p:cNvPr id="1" name=""/>
+        <p:cNvGrpSpPr/>
+        <p:nvPr/>
+      </p:nvGrpSpPr>
+      <p:grpSpPr>
+        <a:xfrm>
+          <a:off x="0" y="0"/>
+          <a:ext cx="0" cy="0"/>
+          <a:chOff x="0" y="0"/>
+          <a:chExt cx="0" cy="0"/>
+        </a:xfrm>
+      </p:grpSpPr>
+      <p:sp>
+        <p:nvSpPr>
+          <p:cNvPr id="2" name="Slide Image Placeholder 1"/>
+          <p:cNvSpPr>
+            <a:spLocks noGrp="1" noRot="1" noChangeAspect="1"/>
+          </p:cNvSpPr>
+          <p:nvPr>
+            <p:ph type="sldImg"/>
+          </p:nvPr>
+        </p:nvSpPr>
+        <p:spPr/>
+      </p:sp>
+      <p:sp>
+        <p:nvSpPr>
+          <p:cNvPr id="3" name="Notes Placeholder 2"/>
+          <p:cNvSpPr>
+            <a:spLocks noGrp="1"/>
+          </p:cNvSpPr>
+          <p:nvPr>
+            <p:ph type="body" idx="1"/>
+          </p:nvPr>
+        </p:nvSpPr>
+        <p:spPr/>
+        <p:txBody>
+          <a:bodyPr/>
+          <a:lstStyle/>
+          <a:p>
+            <a:endParaRPr lang="en-US" dirty="0"/>
+          </a:p>
+        </p:txBody>
+      </p:sp>
+    </p:spTree>
+    <p:extLst>
+      <p:ext uri="{BB962C8B-B14F-4D97-AF65-F5344CB8AC3E}">
+        <p14:creationId xmlns:p14="http://schemas.microsoft.com/office/powerpoint/2010/main" val="275413102"/>
+      </p:ext>
+    </p:extLst>
+  </p:cSld>
+  <p:clrMapOvr>
+    <a:masterClrMapping/>
+  </p:clrMapOvr>
+</p:notes>
+</file>
+
+<file path=ppt/notesSlides/notesSlide26.xml><?xml version="1.0" encoding="utf-8"?>
 <p:notes xmlns:a="http://schemas.openxmlformats.org/drawingml/2006/main" xmlns:r="http://schemas.openxmlformats.org/officeDocument/2006/relationships" xmlns:p="http://schemas.openxmlformats.org/presentationml/2006/main" showMasterSp="0" showMasterPhAnim="0">
   <p:cSld>
     <p:spTree>
@@ -4923,7 +4987,7 @@
 </p:notes>
 </file>
 
-<file path=ppt/notesSlides/notesSlide26.xml><?xml version="1.0" encoding="utf-8"?>
+<file path=ppt/notesSlides/notesSlide27.xml><?xml version="1.0" encoding="utf-8"?>
 <p:notes xmlns:a="http://schemas.openxmlformats.org/drawingml/2006/main" xmlns:r="http://schemas.openxmlformats.org/officeDocument/2006/relationships" xmlns:p="http://schemas.openxmlformats.org/presentationml/2006/main" showMasterSp="0" showMasterPhAnim="0">
   <p:cSld>
     <p:spTree>
@@ -5027,7 +5091,7 @@
 </p:notes>
 </file>
 
-<file path=ppt/notesSlides/notesSlide27.xml><?xml version="1.0" encoding="utf-8"?>
+<file path=ppt/notesSlides/notesSlide28.xml><?xml version="1.0" encoding="utf-8"?>
 <p:notes xmlns:a="http://schemas.openxmlformats.org/drawingml/2006/main" xmlns:r="http://schemas.openxmlformats.org/officeDocument/2006/relationships" xmlns:p="http://schemas.openxmlformats.org/presentationml/2006/main" showMasterSp="0" showMasterPhAnim="0">
   <p:cSld>
     <p:spTree>
@@ -6356,8 +6420,291 @@
                 </a:highlight>
                 <a:latin typeface="Söhne"/>
               </a:rPr>
-              <a:t> Router dựa trên hệ thống tệp được xây dựng trên cơ sở của Server Components hỗ trợ layouts, định tuyến lồng nhau, trạng thái tải, xử lý lỗi và nhiều tính năng khác.</a:t>
-            </a:r>
+              <a:t> Next.js cung cấp một cơ chế định tuyến dựa trên thư mục và tên file đơn giản. Mỗi file trong thư mục pages tương ứng với một route trên </a:t>
+            </a:r>
+            <a:r>
+              <a:rPr lang="en-US" b="0" i="0" dirty="0" err="1">
+                <a:solidFill>
+                  <a:srgbClr val="ECECEC"/>
+                </a:solidFill>
+                <a:effectLst/>
+                <a:highlight>
+                  <a:srgbClr val="212121"/>
+                </a:highlight>
+                <a:latin typeface="Söhne"/>
+              </a:rPr>
+              <a:t>dự</a:t>
+            </a:r>
+            <a:r>
+              <a:rPr lang="en-US" b="0" i="0" dirty="0">
+                <a:solidFill>
+                  <a:srgbClr val="ECECEC"/>
+                </a:solidFill>
+                <a:effectLst/>
+                <a:highlight>
+                  <a:srgbClr val="212121"/>
+                </a:highlight>
+                <a:latin typeface="Söhne"/>
+              </a:rPr>
+              <a:t> </a:t>
+            </a:r>
+            <a:r>
+              <a:rPr lang="en-US" b="0" i="0" dirty="0" err="1">
+                <a:solidFill>
+                  <a:srgbClr val="ECECEC"/>
+                </a:solidFill>
+                <a:effectLst/>
+                <a:highlight>
+                  <a:srgbClr val="212121"/>
+                </a:highlight>
+                <a:latin typeface="Söhne"/>
+              </a:rPr>
+              <a:t>án</a:t>
+            </a:r>
+            <a:r>
+              <a:rPr lang="en-US" b="0" i="0" dirty="0">
+                <a:solidFill>
+                  <a:srgbClr val="ECECEC"/>
+                </a:solidFill>
+                <a:effectLst/>
+                <a:highlight>
+                  <a:srgbClr val="212121"/>
+                </a:highlight>
+                <a:latin typeface="Söhne"/>
+              </a:rPr>
+              <a:t>, </a:t>
+            </a:r>
+            <a:r>
+              <a:rPr lang="en-US" b="0" i="0" dirty="0" err="1">
+                <a:solidFill>
+                  <a:srgbClr val="ECECEC"/>
+                </a:solidFill>
+                <a:effectLst/>
+                <a:highlight>
+                  <a:srgbClr val="212121"/>
+                </a:highlight>
+                <a:latin typeface="Söhne"/>
+              </a:rPr>
+              <a:t>gồm</a:t>
+            </a:r>
+            <a:r>
+              <a:rPr lang="en-US" b="0" i="0" dirty="0">
+                <a:solidFill>
+                  <a:srgbClr val="ECECEC"/>
+                </a:solidFill>
+                <a:effectLst/>
+                <a:highlight>
+                  <a:srgbClr val="212121"/>
+                </a:highlight>
+                <a:latin typeface="Söhne"/>
+              </a:rPr>
+              <a:t> </a:t>
+            </a:r>
+            <a:r>
+              <a:rPr lang="en-US" b="0" i="0" dirty="0" err="1">
+                <a:solidFill>
+                  <a:srgbClr val="ECECEC"/>
+                </a:solidFill>
+                <a:effectLst/>
+                <a:highlight>
+                  <a:srgbClr val="212121"/>
+                </a:highlight>
+                <a:latin typeface="Söhne"/>
+              </a:rPr>
+              <a:t>có</a:t>
+            </a:r>
+            <a:r>
+              <a:rPr lang="en-US" b="0" i="0" dirty="0">
+                <a:solidFill>
+                  <a:srgbClr val="ECECEC"/>
+                </a:solidFill>
+                <a:effectLst/>
+                <a:highlight>
+                  <a:srgbClr val="212121"/>
+                </a:highlight>
+                <a:latin typeface="Söhne"/>
+              </a:rPr>
+              <a:t> nestle route (</a:t>
+            </a:r>
+            <a:r>
+              <a:rPr lang="en-US" b="0" i="0" dirty="0" err="1">
+                <a:solidFill>
+                  <a:srgbClr val="ECECEC"/>
+                </a:solidFill>
+                <a:effectLst/>
+                <a:highlight>
+                  <a:srgbClr val="212121"/>
+                </a:highlight>
+                <a:latin typeface="Söhne"/>
+              </a:rPr>
+              <a:t>định</a:t>
+            </a:r>
+            <a:r>
+              <a:rPr lang="en-US" b="0" i="0" dirty="0">
+                <a:solidFill>
+                  <a:srgbClr val="ECECEC"/>
+                </a:solidFill>
+                <a:effectLst/>
+                <a:highlight>
+                  <a:srgbClr val="212121"/>
+                </a:highlight>
+                <a:latin typeface="Söhne"/>
+              </a:rPr>
+              <a:t> </a:t>
+            </a:r>
+            <a:r>
+              <a:rPr lang="en-US" b="0" i="0" dirty="0" err="1">
+                <a:solidFill>
+                  <a:srgbClr val="ECECEC"/>
+                </a:solidFill>
+                <a:effectLst/>
+                <a:highlight>
+                  <a:srgbClr val="212121"/>
+                </a:highlight>
+                <a:latin typeface="Söhne"/>
+              </a:rPr>
+              <a:t>tuyến</a:t>
+            </a:r>
+            <a:r>
+              <a:rPr lang="en-US" b="0" i="0" dirty="0">
+                <a:solidFill>
+                  <a:srgbClr val="ECECEC"/>
+                </a:solidFill>
+                <a:effectLst/>
+                <a:highlight>
+                  <a:srgbClr val="212121"/>
+                </a:highlight>
+                <a:latin typeface="Söhne"/>
+              </a:rPr>
+              <a:t> </a:t>
+            </a:r>
+            <a:r>
+              <a:rPr lang="en-US" b="0" i="0" dirty="0" err="1">
+                <a:solidFill>
+                  <a:srgbClr val="ECECEC"/>
+                </a:solidFill>
+                <a:effectLst/>
+                <a:highlight>
+                  <a:srgbClr val="212121"/>
+                </a:highlight>
+                <a:latin typeface="Söhne"/>
+              </a:rPr>
+              <a:t>lồng</a:t>
+            </a:r>
+            <a:r>
+              <a:rPr lang="en-US" b="0" i="0" dirty="0">
+                <a:solidFill>
+                  <a:srgbClr val="ECECEC"/>
+                </a:solidFill>
+                <a:effectLst/>
+                <a:highlight>
+                  <a:srgbClr val="212121"/>
+                </a:highlight>
+                <a:latin typeface="Söhne"/>
+              </a:rPr>
+              <a:t>), dynamic route (</a:t>
+            </a:r>
+            <a:r>
+              <a:rPr lang="en-US" b="0" i="0" dirty="0" err="1">
+                <a:solidFill>
+                  <a:srgbClr val="ECECEC"/>
+                </a:solidFill>
+                <a:effectLst/>
+                <a:highlight>
+                  <a:srgbClr val="212121"/>
+                </a:highlight>
+                <a:latin typeface="Söhne"/>
+              </a:rPr>
+              <a:t>định</a:t>
+            </a:r>
+            <a:r>
+              <a:rPr lang="en-US" b="0" i="0" dirty="0">
+                <a:solidFill>
+                  <a:srgbClr val="ECECEC"/>
+                </a:solidFill>
+                <a:effectLst/>
+                <a:highlight>
+                  <a:srgbClr val="212121"/>
+                </a:highlight>
+                <a:latin typeface="Söhne"/>
+              </a:rPr>
+              <a:t> </a:t>
+            </a:r>
+            <a:r>
+              <a:rPr lang="en-US" b="0" i="0" dirty="0" err="1">
+                <a:solidFill>
+                  <a:srgbClr val="ECECEC"/>
+                </a:solidFill>
+                <a:effectLst/>
+                <a:highlight>
+                  <a:srgbClr val="212121"/>
+                </a:highlight>
+                <a:latin typeface="Söhne"/>
+              </a:rPr>
+              <a:t>tuyến</a:t>
+            </a:r>
+            <a:r>
+              <a:rPr lang="en-US" b="0" i="0" dirty="0">
+                <a:solidFill>
+                  <a:srgbClr val="ECECEC"/>
+                </a:solidFill>
+                <a:effectLst/>
+                <a:highlight>
+                  <a:srgbClr val="212121"/>
+                </a:highlight>
+                <a:latin typeface="Söhne"/>
+              </a:rPr>
+              <a:t> </a:t>
+            </a:r>
+            <a:r>
+              <a:rPr lang="en-US" b="0" i="0" dirty="0" err="1">
+                <a:solidFill>
+                  <a:srgbClr val="ECECEC"/>
+                </a:solidFill>
+                <a:effectLst/>
+                <a:highlight>
+                  <a:srgbClr val="212121"/>
+                </a:highlight>
+                <a:latin typeface="Söhne"/>
+              </a:rPr>
+              <a:t>động</a:t>
+            </a:r>
+            <a:r>
+              <a:rPr lang="en-US" b="0" i="0" dirty="0">
+                <a:solidFill>
+                  <a:srgbClr val="ECECEC"/>
+                </a:solidFill>
+                <a:effectLst/>
+                <a:highlight>
+                  <a:srgbClr val="212121"/>
+                </a:highlight>
+                <a:latin typeface="Söhne"/>
+              </a:rPr>
+              <a:t>), …</a:t>
+            </a:r>
+            <a:r>
+              <a:rPr lang="vi-VN" b="0" i="0" dirty="0">
+                <a:solidFill>
+                  <a:srgbClr val="ECECEC"/>
+                </a:solidFill>
+                <a:effectLst/>
+                <a:highlight>
+                  <a:srgbClr val="212121"/>
+                </a:highlight>
+                <a:latin typeface="Söhne"/>
+              </a:rPr>
+              <a:t>.</a:t>
+            </a:r>
+            <a:endParaRPr lang="en-US" b="0" i="0" dirty="0">
+              <a:solidFill>
+                <a:srgbClr val="ECECEC"/>
+              </a:solidFill>
+              <a:effectLst/>
+              <a:highlight>
+                <a:srgbClr val="212121"/>
+              </a:highlight>
+              <a:latin typeface="Söhne"/>
+            </a:endParaRPr>
           </a:p>
           <a:p>
             <a:pPr algn="l">
@@ -6390,6 +6737,84 @@
               </a:rPr>
               <a:t> Kết xuất trên phía máy khách và phía máy chủ với Client và Server Components. Tiếp tục tối ưu hóa với Kết xuất Tĩnh và Động trên máy chủ với Next.js. Streaming trên Edge và các runtime của Node.js.</a:t>
             </a:r>
+            <a:r>
+              <a:rPr lang="en-US" b="0" i="0" dirty="0">
+                <a:solidFill>
+                  <a:srgbClr val="ECECEC"/>
+                </a:solidFill>
+                <a:effectLst/>
+                <a:highlight>
+                  <a:srgbClr val="212121"/>
+                </a:highlight>
+                <a:latin typeface="Söhne"/>
+              </a:rPr>
+              <a:t> </a:t>
+            </a:r>
+            <a:r>
+              <a:rPr lang="vi-VN" b="0" i="0" dirty="0">
+                <a:solidFill>
+                  <a:srgbClr val="ECECEC"/>
+                </a:solidFill>
+                <a:effectLst/>
+                <a:highlight>
+                  <a:srgbClr val="212121"/>
+                </a:highlight>
+                <a:latin typeface="Söhne"/>
+              </a:rPr>
+              <a:t>Next.js hỗ trợ cả Server-side Rendering (SSR) và Static Site Generation (SSG).</a:t>
+            </a:r>
+            <a:r>
+              <a:rPr lang="en-US" b="0" i="0" dirty="0">
+                <a:solidFill>
+                  <a:srgbClr val="ECECEC"/>
+                </a:solidFill>
+                <a:effectLst/>
+                <a:highlight>
+                  <a:srgbClr val="212121"/>
+                </a:highlight>
+                <a:latin typeface="Söhne"/>
+              </a:rPr>
+              <a:t> </a:t>
+            </a:r>
+            <a:r>
+              <a:rPr lang="vi-VN" b="0" i="0" dirty="0">
+                <a:solidFill>
+                  <a:srgbClr val="ECECEC"/>
+                </a:solidFill>
+                <a:effectLst/>
+                <a:highlight>
+                  <a:srgbClr val="212121"/>
+                </a:highlight>
+                <a:latin typeface="Söhne"/>
+              </a:rPr>
+              <a:t>SSR giúp tăng tốc độ tải trang bằng cách render trang từ phía máy chủ trước khi gửi đến trình duyệt.</a:t>
+            </a:r>
+            <a:r>
+              <a:rPr lang="en-US" b="0" i="0" dirty="0">
+                <a:solidFill>
+                  <a:srgbClr val="ECECEC"/>
+                </a:solidFill>
+                <a:effectLst/>
+                <a:highlight>
+                  <a:srgbClr val="212121"/>
+                </a:highlight>
+                <a:latin typeface="Söhne"/>
+              </a:rPr>
+              <a:t> </a:t>
+            </a:r>
+            <a:r>
+              <a:rPr lang="vi-VN" b="0" i="0" dirty="0">
+                <a:solidFill>
+                  <a:srgbClr val="ECECEC"/>
+                </a:solidFill>
+                <a:effectLst/>
+                <a:highlight>
+                  <a:srgbClr val="212121"/>
+                </a:highlight>
+                <a:latin typeface="Söhne"/>
+              </a:rPr>
+              <a:t>SSG cho phép bạn tạo trang tĩnh tại thời điểm build, giúp tăng hiệu suất và giảm tải cho máy chủ.</a:t>
+            </a:r>
           </a:p>
           <a:p>
             <a:pPr algn="l">
@@ -6421,6 +6846,32 @@
                 <a:latin typeface="Söhne"/>
               </a:rPr>
               <a:t> Truy xuất dữ liệu đơn giản hóa với async/await trong Server Components, và một fetch API mở rộng để nhớ lời gọi yêu cầu, caching dữ liệu và tái xác thực.</a:t>
+            </a:r>
+            <a:r>
+              <a:rPr lang="en-US" b="0" i="0" dirty="0">
+                <a:solidFill>
+                  <a:srgbClr val="ECECEC"/>
+                </a:solidFill>
+                <a:effectLst/>
+                <a:highlight>
+                  <a:srgbClr val="212121"/>
+                </a:highlight>
+                <a:latin typeface="Söhne"/>
+              </a:rPr>
+              <a:t> C</a:t>
+            </a:r>
+            <a:r>
+              <a:rPr lang="vi-VN" b="0" i="0" dirty="0">
+                <a:solidFill>
+                  <a:srgbClr val="ECECEC"/>
+                </a:solidFill>
+                <a:effectLst/>
+                <a:highlight>
+                  <a:srgbClr val="212121"/>
+                </a:highlight>
+                <a:latin typeface="Söhne"/>
+              </a:rPr>
+              <a:t>ó thể sử dụng các phương thức như getServerSideProps, getStaticProps, hoặc useEffect để lấy dữ liệu và truyền vào các component của bạn</a:t>
             </a:r>
           </a:p>
           <a:p>
@@ -18405,8 +18856,8 @@
         </p:nvSpPr>
         <p:spPr>
           <a:xfrm>
-            <a:off x="3409494" y="2382606"/>
-            <a:ext cx="4247082" cy="818400"/>
+            <a:off x="3641123" y="2431763"/>
+            <a:ext cx="1861753" cy="818400"/>
           </a:xfrm>
           <a:prstGeom prst="rect">
             <a:avLst/>
@@ -18447,8 +18898,8 @@
         </p:nvSpPr>
         <p:spPr>
           <a:xfrm>
-            <a:off x="3746550" y="1339163"/>
-            <a:ext cx="1650900" cy="978300"/>
+            <a:off x="3900419" y="1453463"/>
+            <a:ext cx="1343162" cy="978300"/>
           </a:xfrm>
           <a:prstGeom prst="rect">
             <a:avLst/>
@@ -18474,57 +18925,6 @@
               <a:t>04</a:t>
             </a:r>
             <a:endParaRPr dirty="0"/>
-          </a:p>
-        </p:txBody>
-      </p:sp>
-      <p:sp>
-        <p:nvSpPr>
-          <p:cNvPr id="574" name="Google Shape;574;p69"/>
-          <p:cNvSpPr txBox="1">
-            <a:spLocks noGrp="1"/>
-          </p:cNvSpPr>
-          <p:nvPr>
-            <p:ph type="subTitle" idx="1"/>
-          </p:nvPr>
-        </p:nvSpPr>
-        <p:spPr>
-          <a:xfrm>
-            <a:off x="2291400" y="3076675"/>
-            <a:ext cx="4561200" cy="393000"/>
-          </a:xfrm>
-          <a:prstGeom prst="rect">
-            <a:avLst/>
-          </a:prstGeom>
-        </p:spPr>
-        <p:txBody>
-          <a:bodyPr spcFirstLastPara="1" wrap="square" lIns="91425" tIns="91425" rIns="91425" bIns="91425" anchor="t" anchorCtr="0">
-            <a:noAutofit/>
-          </a:bodyPr>
-          <a:lstStyle/>
-          <a:p>
-            <a:pPr marL="0" lvl="0" indent="0" algn="ctr" rtl="0">
-              <a:spcBef>
-                <a:spcPts val="0"/>
-              </a:spcBef>
-              <a:spcAft>
-                <a:spcPts val="0"/>
-              </a:spcAft>
-              <a:buClr>
-                <a:schemeClr val="dk1"/>
-              </a:buClr>
-              <a:buSzPts val="1100"/>
-              <a:buFont typeface="Arial"/>
-              <a:buNone/>
-            </a:pPr>
-            <a:r>
-              <a:rPr lang="en">
-                <a:solidFill>
-                  <a:schemeClr val="dk1"/>
-                </a:solidFill>
-              </a:rPr>
-              <a:t>Insert a subtitle here if you need it</a:t>
-            </a:r>
-            <a:endParaRPr/>
           </a:p>
         </p:txBody>
       </p:sp>
@@ -18542,6 +18942,304 @@
 </file>
 
 <file path=ppt/slides/slide25.xml><?xml version="1.0" encoding="utf-8"?>
+<p:sld xmlns:a="http://schemas.openxmlformats.org/drawingml/2006/main" xmlns:r="http://schemas.openxmlformats.org/officeDocument/2006/relationships" xmlns:p="http://schemas.openxmlformats.org/presentationml/2006/main">
+  <p:cSld>
+    <p:spTree>
+      <p:nvGrpSpPr>
+        <p:cNvPr id="1" name=""/>
+        <p:cNvGrpSpPr/>
+        <p:nvPr/>
+      </p:nvGrpSpPr>
+      <p:grpSpPr>
+        <a:xfrm>
+          <a:off x="0" y="0"/>
+          <a:ext cx="0" cy="0"/>
+          <a:chOff x="0" y="0"/>
+          <a:chExt cx="0" cy="0"/>
+        </a:xfrm>
+      </p:grpSpPr>
+      <p:sp>
+        <p:nvSpPr>
+          <p:cNvPr id="11" name="Title 10">
+            <a:extLst>
+              <a:ext uri="{FF2B5EF4-FFF2-40B4-BE49-F238E27FC236}">
+                <a16:creationId xmlns:a16="http://schemas.microsoft.com/office/drawing/2014/main" id="{6B9A5B71-8308-FE76-C367-A5490BF3FE63}"/>
+              </a:ext>
+            </a:extLst>
+          </p:cNvPr>
+          <p:cNvSpPr>
+            <a:spLocks noGrp="1"/>
+          </p:cNvSpPr>
+          <p:nvPr>
+            <p:ph type="title" idx="9"/>
+          </p:nvPr>
+        </p:nvSpPr>
+        <p:spPr>
+          <a:xfrm>
+            <a:off x="1659784" y="2238000"/>
+            <a:ext cx="2100038" cy="667500"/>
+          </a:xfrm>
+        </p:spPr>
+        <p:txBody>
+          <a:bodyPr/>
+          <a:lstStyle/>
+          <a:p>
+            <a:r>
+              <a:rPr lang="en-US" dirty="0"/>
+              <a:t>Route</a:t>
+            </a:r>
+          </a:p>
+        </p:txBody>
+      </p:sp>
+      <p:sp>
+        <p:nvSpPr>
+          <p:cNvPr id="12" name="Title 11">
+            <a:extLst>
+              <a:ext uri="{FF2B5EF4-FFF2-40B4-BE49-F238E27FC236}">
+                <a16:creationId xmlns:a16="http://schemas.microsoft.com/office/drawing/2014/main" id="{DAE72A4F-322A-0D46-BAE0-91A29A49DF46}"/>
+              </a:ext>
+            </a:extLst>
+          </p:cNvPr>
+          <p:cNvSpPr>
+            <a:spLocks noGrp="1"/>
+          </p:cNvSpPr>
+          <p:nvPr>
+            <p:ph type="title" idx="13"/>
+          </p:nvPr>
+        </p:nvSpPr>
+        <p:spPr>
+          <a:xfrm>
+            <a:off x="5244353" y="2238000"/>
+            <a:ext cx="2534550" cy="667500"/>
+          </a:xfrm>
+        </p:spPr>
+        <p:txBody>
+          <a:bodyPr/>
+          <a:lstStyle/>
+          <a:p>
+            <a:r>
+              <a:rPr lang="en-US" dirty="0"/>
+              <a:t>Rendering</a:t>
+            </a:r>
+          </a:p>
+        </p:txBody>
+      </p:sp>
+    </p:spTree>
+    <p:extLst>
+      <p:ext uri="{BB962C8B-B14F-4D97-AF65-F5344CB8AC3E}">
+        <p14:creationId xmlns:p14="http://schemas.microsoft.com/office/powerpoint/2010/main" val="3351293490"/>
+      </p:ext>
+    </p:extLst>
+  </p:cSld>
+  <p:clrMapOvr>
+    <a:masterClrMapping/>
+  </p:clrMapOvr>
+</p:sld>
+</file>
+
+<file path=ppt/slides/slide26.xml><?xml version="1.0" encoding="utf-8"?>
+<p:sld xmlns:a="http://schemas.openxmlformats.org/drawingml/2006/main" xmlns:r="http://schemas.openxmlformats.org/officeDocument/2006/relationships" xmlns:p="http://schemas.openxmlformats.org/presentationml/2006/main">
+  <p:cSld>
+    <p:spTree>
+      <p:nvGrpSpPr>
+        <p:cNvPr id="1" name=""/>
+        <p:cNvGrpSpPr/>
+        <p:nvPr/>
+      </p:nvGrpSpPr>
+      <p:grpSpPr>
+        <a:xfrm>
+          <a:off x="0" y="0"/>
+          <a:ext cx="0" cy="0"/>
+          <a:chOff x="0" y="0"/>
+          <a:chExt cx="0" cy="0"/>
+        </a:xfrm>
+      </p:grpSpPr>
+      <p:sp>
+        <p:nvSpPr>
+          <p:cNvPr id="3" name="Subtitle 2">
+            <a:extLst>
+              <a:ext uri="{FF2B5EF4-FFF2-40B4-BE49-F238E27FC236}">
+                <a16:creationId xmlns:a16="http://schemas.microsoft.com/office/drawing/2014/main" id="{2A46741F-DF66-4192-AD4C-E85BF4D11F78}"/>
+              </a:ext>
+            </a:extLst>
+          </p:cNvPr>
+          <p:cNvSpPr>
+            <a:spLocks noGrp="1"/>
+          </p:cNvSpPr>
+          <p:nvPr>
+            <p:ph type="subTitle" idx="2"/>
+          </p:nvPr>
+        </p:nvSpPr>
+        <p:spPr>
+          <a:xfrm>
+            <a:off x="713225" y="1398494"/>
+            <a:ext cx="7778593" cy="3145556"/>
+          </a:xfrm>
+        </p:spPr>
+        <p:txBody>
+          <a:bodyPr/>
+          <a:lstStyle/>
+          <a:p>
+            <a:r>
+              <a:rPr lang="vi-VN" sz="1800" dirty="0"/>
+              <a:t>Next.js cung cấp một cơ chế định tuyến dựa trên thư mục và tên file đơn giản. Mỗi file trong thư mục pages tương ứng với một route trên ứng dụng của bạn.</a:t>
+            </a:r>
+          </a:p>
+          <a:p>
+            <a:r>
+              <a:rPr lang="vi-VN" sz="1800" dirty="0"/>
+              <a:t>Bạn có thể tạo các thư mục con trong thư mục pages để tạo ra các route lồng nhau. Ví dụ: pages/about/index.js sẽ tạo ra route /about.</a:t>
+            </a:r>
+            <a:endParaRPr lang="en-US" sz="1800" dirty="0"/>
+          </a:p>
+        </p:txBody>
+      </p:sp>
+      <p:sp>
+        <p:nvSpPr>
+          <p:cNvPr id="4" name="Title 3">
+            <a:extLst>
+              <a:ext uri="{FF2B5EF4-FFF2-40B4-BE49-F238E27FC236}">
+                <a16:creationId xmlns:a16="http://schemas.microsoft.com/office/drawing/2014/main" id="{1665B430-D06C-A667-0B12-5FF108DAB890}"/>
+              </a:ext>
+            </a:extLst>
+          </p:cNvPr>
+          <p:cNvSpPr>
+            <a:spLocks noGrp="1"/>
+          </p:cNvSpPr>
+          <p:nvPr>
+            <p:ph type="title"/>
+          </p:nvPr>
+        </p:nvSpPr>
+        <p:spPr/>
+        <p:txBody>
+          <a:bodyPr/>
+          <a:lstStyle/>
+          <a:p>
+            <a:r>
+              <a:rPr lang="en-US" dirty="0"/>
+              <a:t>Route</a:t>
+            </a:r>
+          </a:p>
+        </p:txBody>
+      </p:sp>
+    </p:spTree>
+    <p:extLst>
+      <p:ext uri="{BB962C8B-B14F-4D97-AF65-F5344CB8AC3E}">
+        <p14:creationId xmlns:p14="http://schemas.microsoft.com/office/powerpoint/2010/main" val="2169637909"/>
+      </p:ext>
+    </p:extLst>
+  </p:cSld>
+  <p:clrMapOvr>
+    <a:masterClrMapping/>
+  </p:clrMapOvr>
+</p:sld>
+</file>
+
+<file path=ppt/slides/slide27.xml><?xml version="1.0" encoding="utf-8"?>
+<p:sld xmlns:a="http://schemas.openxmlformats.org/drawingml/2006/main" xmlns:r="http://schemas.openxmlformats.org/officeDocument/2006/relationships" xmlns:p="http://schemas.openxmlformats.org/presentationml/2006/main">
+  <p:cSld>
+    <p:spTree>
+      <p:nvGrpSpPr>
+        <p:cNvPr id="1" name=""/>
+        <p:cNvGrpSpPr/>
+        <p:nvPr/>
+      </p:nvGrpSpPr>
+      <p:grpSpPr>
+        <a:xfrm>
+          <a:off x="0" y="0"/>
+          <a:ext cx="0" cy="0"/>
+          <a:chOff x="0" y="0"/>
+          <a:chExt cx="0" cy="0"/>
+        </a:xfrm>
+      </p:grpSpPr>
+      <p:sp>
+        <p:nvSpPr>
+          <p:cNvPr id="3" name="Subtitle 2">
+            <a:extLst>
+              <a:ext uri="{FF2B5EF4-FFF2-40B4-BE49-F238E27FC236}">
+                <a16:creationId xmlns:a16="http://schemas.microsoft.com/office/drawing/2014/main" id="{CE455823-C64F-D5C7-0B85-DA233AB2053E}"/>
+              </a:ext>
+            </a:extLst>
+          </p:cNvPr>
+          <p:cNvSpPr>
+            <a:spLocks noGrp="1"/>
+          </p:cNvSpPr>
+          <p:nvPr>
+            <p:ph type="subTitle" idx="2"/>
+          </p:nvPr>
+        </p:nvSpPr>
+        <p:spPr>
+          <a:xfrm>
+            <a:off x="713225" y="1017725"/>
+            <a:ext cx="8054257" cy="3526325"/>
+          </a:xfrm>
+        </p:spPr>
+        <p:txBody>
+          <a:bodyPr/>
+          <a:lstStyle/>
+          <a:p>
+            <a:r>
+              <a:rPr lang="vi-VN" sz="2000" dirty="0"/>
+              <a:t>Next.js hỗ trợ cả Server-side Rendering (SSR) và Static Site Generation (SSG).</a:t>
+            </a:r>
+          </a:p>
+          <a:p>
+            <a:r>
+              <a:rPr lang="vi-VN" sz="2000" dirty="0"/>
+              <a:t>SSR giúp tăng tốc độ tải trang bằng cách render trang từ phía máy chủ trước khi gửi đến trình duyệt.</a:t>
+            </a:r>
+          </a:p>
+          <a:p>
+            <a:r>
+              <a:rPr lang="vi-VN" sz="2000" dirty="0"/>
+              <a:t>SSG cho phép bạn tạo trang tĩnh tại thời điểm build, giúp tăng hiệu suất và giảm tải cho máy chủ.</a:t>
+            </a:r>
+            <a:endParaRPr lang="en-US" sz="2000" dirty="0"/>
+          </a:p>
+        </p:txBody>
+      </p:sp>
+      <p:sp>
+        <p:nvSpPr>
+          <p:cNvPr id="4" name="Title 3">
+            <a:extLst>
+              <a:ext uri="{FF2B5EF4-FFF2-40B4-BE49-F238E27FC236}">
+                <a16:creationId xmlns:a16="http://schemas.microsoft.com/office/drawing/2014/main" id="{D802199E-1DB4-6A36-0293-12E228D7D72B}"/>
+              </a:ext>
+            </a:extLst>
+          </p:cNvPr>
+          <p:cNvSpPr>
+            <a:spLocks noGrp="1"/>
+          </p:cNvSpPr>
+          <p:nvPr>
+            <p:ph type="title"/>
+          </p:nvPr>
+        </p:nvSpPr>
+        <p:spPr/>
+        <p:txBody>
+          <a:bodyPr/>
+          <a:lstStyle/>
+          <a:p>
+            <a:r>
+              <a:rPr lang="en-US" dirty="0"/>
+              <a:t>Rendering</a:t>
+            </a:r>
+          </a:p>
+        </p:txBody>
+      </p:sp>
+    </p:spTree>
+    <p:extLst>
+      <p:ext uri="{BB962C8B-B14F-4D97-AF65-F5344CB8AC3E}">
+        <p14:creationId xmlns:p14="http://schemas.microsoft.com/office/powerpoint/2010/main" val="2673083503"/>
+      </p:ext>
+    </p:extLst>
+  </p:cSld>
+  <p:clrMapOvr>
+    <a:masterClrMapping/>
+  </p:clrMapOvr>
+</p:sld>
+</file>
+
+<file path=ppt/slides/slide28.xml><?xml version="1.0" encoding="utf-8"?>
 <p:sld xmlns:a="http://schemas.openxmlformats.org/drawingml/2006/main" xmlns:r="http://schemas.openxmlformats.org/officeDocument/2006/relationships" xmlns:p="http://schemas.openxmlformats.org/presentationml/2006/main">
   <p:cSld>
     <p:spTree>
@@ -18608,7 +19306,7 @@
 </p:sld>
 </file>
 
-<file path=ppt/slides/slide26.xml><?xml version="1.0" encoding="utf-8"?>
+<file path=ppt/slides/slide29.xml><?xml version="1.0" encoding="utf-8"?>
 <p:sld xmlns:a="http://schemas.openxmlformats.org/drawingml/2006/main" xmlns:r="http://schemas.openxmlformats.org/officeDocument/2006/relationships" xmlns:p="http://schemas.openxmlformats.org/presentationml/2006/main">
   <p:cSld>
     <p:spTree>
@@ -18799,7 +19497,167 @@
 </p:sld>
 </file>
 
-<file path=ppt/slides/slide27.xml><?xml version="1.0" encoding="utf-8"?>
+<file path=ppt/slides/slide3.xml><?xml version="1.0" encoding="utf-8"?>
+<p:sld xmlns:a="http://schemas.openxmlformats.org/drawingml/2006/main" xmlns:r="http://schemas.openxmlformats.org/officeDocument/2006/relationships" xmlns:p="http://schemas.openxmlformats.org/presentationml/2006/main">
+  <p:cSld>
+    <p:spTree>
+      <p:nvGrpSpPr>
+        <p:cNvPr id="1" name="Shape 571"/>
+        <p:cNvGrpSpPr/>
+        <p:nvPr/>
+      </p:nvGrpSpPr>
+      <p:grpSpPr>
+        <a:xfrm>
+          <a:off x="0" y="0"/>
+          <a:ext cx="0" cy="0"/>
+          <a:chOff x="0" y="0"/>
+          <a:chExt cx="0" cy="0"/>
+        </a:xfrm>
+      </p:grpSpPr>
+      <p:sp>
+        <p:nvSpPr>
+          <p:cNvPr id="572" name="Google Shape;572;p69"/>
+          <p:cNvSpPr txBox="1">
+            <a:spLocks noGrp="1"/>
+          </p:cNvSpPr>
+          <p:nvPr>
+            <p:ph type="title"/>
+          </p:nvPr>
+        </p:nvSpPr>
+        <p:spPr>
+          <a:xfrm>
+            <a:off x="2714550" y="2366272"/>
+            <a:ext cx="3714900" cy="818400"/>
+          </a:xfrm>
+          <a:prstGeom prst="rect">
+            <a:avLst/>
+          </a:prstGeom>
+        </p:spPr>
+        <p:txBody>
+          <a:bodyPr spcFirstLastPara="1" wrap="square" lIns="91425" tIns="91425" rIns="91425" bIns="91425" anchor="t" anchorCtr="0">
+            <a:noAutofit/>
+          </a:bodyPr>
+          <a:lstStyle/>
+          <a:p>
+            <a:pPr marL="0" lvl="0" indent="0" algn="l" rtl="0">
+              <a:spcBef>
+                <a:spcPts val="0"/>
+              </a:spcBef>
+              <a:spcAft>
+                <a:spcPts val="0"/>
+              </a:spcAft>
+              <a:buNone/>
+            </a:pPr>
+            <a:r>
+              <a:rPr lang="en" dirty="0"/>
+              <a:t>Giới thiệu</a:t>
+            </a:r>
+            <a:endParaRPr dirty="0"/>
+          </a:p>
+        </p:txBody>
+      </p:sp>
+      <p:sp>
+        <p:nvSpPr>
+          <p:cNvPr id="573" name="Google Shape;573;p69"/>
+          <p:cNvSpPr txBox="1">
+            <a:spLocks noGrp="1"/>
+          </p:cNvSpPr>
+          <p:nvPr>
+            <p:ph type="title" idx="2"/>
+          </p:nvPr>
+        </p:nvSpPr>
+        <p:spPr>
+          <a:xfrm>
+            <a:off x="3746550" y="1339163"/>
+            <a:ext cx="1650900" cy="978300"/>
+          </a:xfrm>
+          <a:prstGeom prst="rect">
+            <a:avLst/>
+          </a:prstGeom>
+        </p:spPr>
+        <p:txBody>
+          <a:bodyPr spcFirstLastPara="1" wrap="square" lIns="91425" tIns="91425" rIns="91425" bIns="91425" anchor="t" anchorCtr="0">
+            <a:noAutofit/>
+          </a:bodyPr>
+          <a:lstStyle/>
+          <a:p>
+            <a:pPr marL="0" lvl="0" indent="0" algn="l" rtl="0">
+              <a:spcBef>
+                <a:spcPts val="0"/>
+              </a:spcBef>
+              <a:spcAft>
+                <a:spcPts val="0"/>
+              </a:spcAft>
+              <a:buNone/>
+            </a:pPr>
+            <a:r>
+              <a:rPr lang="en"/>
+              <a:t>01</a:t>
+            </a:r>
+            <a:endParaRPr/>
+          </a:p>
+        </p:txBody>
+      </p:sp>
+      <p:sp>
+        <p:nvSpPr>
+          <p:cNvPr id="574" name="Google Shape;574;p69"/>
+          <p:cNvSpPr txBox="1">
+            <a:spLocks noGrp="1"/>
+          </p:cNvSpPr>
+          <p:nvPr>
+            <p:ph type="subTitle" idx="1"/>
+          </p:nvPr>
+        </p:nvSpPr>
+        <p:spPr>
+          <a:xfrm>
+            <a:off x="2291400" y="3076675"/>
+            <a:ext cx="4561200" cy="393000"/>
+          </a:xfrm>
+          <a:prstGeom prst="rect">
+            <a:avLst/>
+          </a:prstGeom>
+        </p:spPr>
+        <p:txBody>
+          <a:bodyPr spcFirstLastPara="1" wrap="square" lIns="91425" tIns="91425" rIns="91425" bIns="91425" anchor="t" anchorCtr="0">
+            <a:noAutofit/>
+          </a:bodyPr>
+          <a:lstStyle/>
+          <a:p>
+            <a:pPr marL="0" lvl="0" indent="0" algn="ctr" rtl="0">
+              <a:spcBef>
+                <a:spcPts val="0"/>
+              </a:spcBef>
+              <a:spcAft>
+                <a:spcPts val="0"/>
+              </a:spcAft>
+              <a:buClr>
+                <a:schemeClr val="dk1"/>
+              </a:buClr>
+              <a:buSzPts val="1100"/>
+              <a:buFont typeface="Arial"/>
+              <a:buNone/>
+            </a:pPr>
+            <a:r>
+              <a:rPr lang="en">
+                <a:solidFill>
+                  <a:schemeClr val="dk1"/>
+                </a:solidFill>
+              </a:rPr>
+              <a:t>Insert a subtitle here if you need it</a:t>
+            </a:r>
+            <a:endParaRPr/>
+          </a:p>
+        </p:txBody>
+      </p:sp>
+    </p:spTree>
+  </p:cSld>
+  <p:clrMapOvr>
+    <a:masterClrMapping/>
+  </p:clrMapOvr>
+</p:sld>
+</file>
+
+<file path=ppt/slides/slide30.xml><?xml version="1.0" encoding="utf-8"?>
 <p:sld xmlns:a="http://schemas.openxmlformats.org/drawingml/2006/main" xmlns:r="http://schemas.openxmlformats.org/officeDocument/2006/relationships" xmlns:p="http://schemas.openxmlformats.org/presentationml/2006/main">
   <p:cSld>
     <p:spTree>
@@ -19108,166 +19966,6 @@
         <p14:creationId xmlns:p14="http://schemas.microsoft.com/office/powerpoint/2010/main" val="659237439"/>
       </p:ext>
     </p:extLst>
-  </p:cSld>
-  <p:clrMapOvr>
-    <a:masterClrMapping/>
-  </p:clrMapOvr>
-</p:sld>
-</file>
-
-<file path=ppt/slides/slide3.xml><?xml version="1.0" encoding="utf-8"?>
-<p:sld xmlns:a="http://schemas.openxmlformats.org/drawingml/2006/main" xmlns:r="http://schemas.openxmlformats.org/officeDocument/2006/relationships" xmlns:p="http://schemas.openxmlformats.org/presentationml/2006/main">
-  <p:cSld>
-    <p:spTree>
-      <p:nvGrpSpPr>
-        <p:cNvPr id="1" name="Shape 571"/>
-        <p:cNvGrpSpPr/>
-        <p:nvPr/>
-      </p:nvGrpSpPr>
-      <p:grpSpPr>
-        <a:xfrm>
-          <a:off x="0" y="0"/>
-          <a:ext cx="0" cy="0"/>
-          <a:chOff x="0" y="0"/>
-          <a:chExt cx="0" cy="0"/>
-        </a:xfrm>
-      </p:grpSpPr>
-      <p:sp>
-        <p:nvSpPr>
-          <p:cNvPr id="572" name="Google Shape;572;p69"/>
-          <p:cNvSpPr txBox="1">
-            <a:spLocks noGrp="1"/>
-          </p:cNvSpPr>
-          <p:nvPr>
-            <p:ph type="title"/>
-          </p:nvPr>
-        </p:nvSpPr>
-        <p:spPr>
-          <a:xfrm>
-            <a:off x="2714550" y="2366272"/>
-            <a:ext cx="3714900" cy="818400"/>
-          </a:xfrm>
-          <a:prstGeom prst="rect">
-            <a:avLst/>
-          </a:prstGeom>
-        </p:spPr>
-        <p:txBody>
-          <a:bodyPr spcFirstLastPara="1" wrap="square" lIns="91425" tIns="91425" rIns="91425" bIns="91425" anchor="t" anchorCtr="0">
-            <a:noAutofit/>
-          </a:bodyPr>
-          <a:lstStyle/>
-          <a:p>
-            <a:pPr marL="0" lvl="0" indent="0" algn="l" rtl="0">
-              <a:spcBef>
-                <a:spcPts val="0"/>
-              </a:spcBef>
-              <a:spcAft>
-                <a:spcPts val="0"/>
-              </a:spcAft>
-              <a:buNone/>
-            </a:pPr>
-            <a:r>
-              <a:rPr lang="en" dirty="0"/>
-              <a:t>Giới thiệu</a:t>
-            </a:r>
-            <a:endParaRPr dirty="0"/>
-          </a:p>
-        </p:txBody>
-      </p:sp>
-      <p:sp>
-        <p:nvSpPr>
-          <p:cNvPr id="573" name="Google Shape;573;p69"/>
-          <p:cNvSpPr txBox="1">
-            <a:spLocks noGrp="1"/>
-          </p:cNvSpPr>
-          <p:nvPr>
-            <p:ph type="title" idx="2"/>
-          </p:nvPr>
-        </p:nvSpPr>
-        <p:spPr>
-          <a:xfrm>
-            <a:off x="3746550" y="1339163"/>
-            <a:ext cx="1650900" cy="978300"/>
-          </a:xfrm>
-          <a:prstGeom prst="rect">
-            <a:avLst/>
-          </a:prstGeom>
-        </p:spPr>
-        <p:txBody>
-          <a:bodyPr spcFirstLastPara="1" wrap="square" lIns="91425" tIns="91425" rIns="91425" bIns="91425" anchor="t" anchorCtr="0">
-            <a:noAutofit/>
-          </a:bodyPr>
-          <a:lstStyle/>
-          <a:p>
-            <a:pPr marL="0" lvl="0" indent="0" algn="l" rtl="0">
-              <a:spcBef>
-                <a:spcPts val="0"/>
-              </a:spcBef>
-              <a:spcAft>
-                <a:spcPts val="0"/>
-              </a:spcAft>
-              <a:buNone/>
-            </a:pPr>
-            <a:r>
-              <a:rPr lang="en"/>
-              <a:t>01</a:t>
-            </a:r>
-            <a:endParaRPr/>
-          </a:p>
-        </p:txBody>
-      </p:sp>
-      <p:sp>
-        <p:nvSpPr>
-          <p:cNvPr id="574" name="Google Shape;574;p69"/>
-          <p:cNvSpPr txBox="1">
-            <a:spLocks noGrp="1"/>
-          </p:cNvSpPr>
-          <p:nvPr>
-            <p:ph type="subTitle" idx="1"/>
-          </p:nvPr>
-        </p:nvSpPr>
-        <p:spPr>
-          <a:xfrm>
-            <a:off x="2291400" y="3076675"/>
-            <a:ext cx="4561200" cy="393000"/>
-          </a:xfrm>
-          <a:prstGeom prst="rect">
-            <a:avLst/>
-          </a:prstGeom>
-        </p:spPr>
-        <p:txBody>
-          <a:bodyPr spcFirstLastPara="1" wrap="square" lIns="91425" tIns="91425" rIns="91425" bIns="91425" anchor="t" anchorCtr="0">
-            <a:noAutofit/>
-          </a:bodyPr>
-          <a:lstStyle/>
-          <a:p>
-            <a:pPr marL="0" lvl="0" indent="0" algn="ctr" rtl="0">
-              <a:spcBef>
-                <a:spcPts val="0"/>
-              </a:spcBef>
-              <a:spcAft>
-                <a:spcPts val="0"/>
-              </a:spcAft>
-              <a:buClr>
-                <a:schemeClr val="dk1"/>
-              </a:buClr>
-              <a:buSzPts val="1100"/>
-              <a:buFont typeface="Arial"/>
-              <a:buNone/>
-            </a:pPr>
-            <a:r>
-              <a:rPr lang="en">
-                <a:solidFill>
-                  <a:schemeClr val="dk1"/>
-                </a:solidFill>
-              </a:rPr>
-              <a:t>Insert a subtitle here if you need it</a:t>
-            </a:r>
-            <a:endParaRPr/>
-          </a:p>
-        </p:txBody>
-      </p:sp>
-    </p:spTree>
   </p:cSld>
   <p:clrMapOvr>
     <a:masterClrMapping/>
@@ -19858,7 +20556,7 @@
         </p:blipFill>
         <p:spPr>
           <a:xfrm>
-            <a:off x="1313995" y="1461932"/>
+            <a:off x="1313995" y="1865348"/>
             <a:ext cx="6516009" cy="2219635"/>
           </a:xfrm>
           <a:prstGeom prst="rect">
@@ -24796,8 +25494,8 @@
         </p:blipFill>
         <p:spPr>
           <a:xfrm>
-            <a:off x="1968163" y="1198697"/>
-            <a:ext cx="5400562" cy="3462440"/>
+            <a:off x="1848970" y="1017725"/>
+            <a:ext cx="5171164" cy="3713119"/>
           </a:xfrm>
           <a:prstGeom prst="rect">
             <a:avLst/>

</xml_diff>

<commit_message>
the end of demo seminar
</commit_message>
<xml_diff>
--- a/Midterm-Seminar/Seminar_NextJS.pptx
+++ b/Midterm-Seminar/Seminar_NextJS.pptx
@@ -2087,6 +2087,18 @@
               </a:rPr>
               <a:t>Sau khi nhập các thông tin cần thiết, create-next-app sẽ tạo ra một thư mục với tên dự án của bạn và cài đặt các phụ thuộc cần thiết.</a:t>
             </a:r>
+            <a:br>
+              <a:rPr lang="vi-VN" b="0" i="0" dirty="0">
+                <a:solidFill>
+                  <a:srgbClr val="ECECEC"/>
+                </a:solidFill>
+                <a:effectLst/>
+                <a:highlight>
+                  <a:srgbClr val="212121"/>
+                </a:highlight>
+                <a:latin typeface="Söhne"/>
+              </a:rPr>
+            </a:br>
             <a:endParaRPr lang="en-US" b="0" i="0" dirty="0">
               <a:solidFill>
                 <a:srgbClr val="ECECEC"/>
@@ -2099,19 +2111,16 @@
             </a:endParaRPr>
           </a:p>
           <a:p>
-            <a:pPr algn="l"/>
-            <a:br>
-              <a:rPr lang="vi-VN" b="0" i="0" dirty="0">
-                <a:solidFill>
-                  <a:srgbClr val="ECECEC"/>
-                </a:solidFill>
-                <a:effectLst/>
-                <a:highlight>
-                  <a:srgbClr val="212121"/>
-                </a:highlight>
-                <a:latin typeface="Söhne"/>
-              </a:rPr>
-            </a:br>
+            <a:pPr marL="171450" lvl="0" indent="-171450" algn="l" rtl="0">
+              <a:spcBef>
+                <a:spcPts val="0"/>
+              </a:spcBef>
+              <a:spcAft>
+                <a:spcPts val="0"/>
+              </a:spcAft>
+              <a:buFont typeface="Arial" panose="020B0604020202020204" pitchFamily="34" charset="0"/>
+              <a:buChar char="•"/>
+            </a:pPr>
             <a:r>
               <a:rPr lang="vi-VN" b="0" i="0" dirty="0">
                 <a:solidFill>
@@ -4849,6 +4858,184 @@
             <p:ph type="sldImg"/>
           </p:nvPr>
         </p:nvSpPr>
+        <p:spPr>
+          <a:xfrm>
+            <a:off x="381000" y="685800"/>
+            <a:ext cx="6096000" cy="3429000"/>
+          </a:xfrm>
+        </p:spPr>
+      </p:sp>
+      <p:sp>
+        <p:nvSpPr>
+          <p:cNvPr id="3" name="Notes Placeholder 2"/>
+          <p:cNvSpPr>
+            <a:spLocks noGrp="1"/>
+          </p:cNvSpPr>
+          <p:nvPr>
+            <p:ph type="body" idx="1"/>
+          </p:nvPr>
+        </p:nvSpPr>
+        <p:spPr/>
+        <p:txBody>
+          <a:bodyPr/>
+          <a:lstStyle/>
+          <a:p>
+            <a:r>
+              <a:rPr lang="en-US" sz="1100" dirty="0"/>
+              <a:t>Trang </a:t>
+            </a:r>
+            <a:r>
+              <a:rPr lang="en-US" sz="1100" dirty="0" err="1"/>
+              <a:t>hiển</a:t>
+            </a:r>
+            <a:r>
+              <a:rPr lang="en-US" sz="1100" dirty="0"/>
+              <a:t> </a:t>
+            </a:r>
+            <a:r>
+              <a:rPr lang="en-US" sz="1100" dirty="0" err="1"/>
+              <a:t>thị</a:t>
+            </a:r>
+            <a:r>
+              <a:rPr lang="en-US" sz="1100" dirty="0"/>
+              <a:t> </a:t>
+            </a:r>
+            <a:r>
+              <a:rPr lang="en-US" sz="1100" dirty="0" err="1"/>
+              <a:t>chính</a:t>
+            </a:r>
+            <a:r>
+              <a:rPr lang="en-US" sz="1100" dirty="0"/>
+              <a:t> </a:t>
+            </a:r>
+            <a:r>
+              <a:rPr lang="en-US" sz="1100" dirty="0" err="1"/>
+              <a:t>sẽ</a:t>
+            </a:r>
+            <a:r>
+              <a:rPr lang="en-US" sz="1100" dirty="0"/>
+              <a:t> </a:t>
+            </a:r>
+            <a:r>
+              <a:rPr lang="en-US" sz="1100" dirty="0" err="1"/>
+              <a:t>có</a:t>
+            </a:r>
+            <a:r>
+              <a:rPr lang="en-US" sz="1100" dirty="0"/>
+              <a:t> </a:t>
+            </a:r>
+            <a:r>
+              <a:rPr lang="en-US" sz="1100" dirty="0" err="1"/>
+              <a:t>dạng</a:t>
+            </a:r>
+            <a:r>
+              <a:rPr lang="en-US" sz="1100" dirty="0"/>
+              <a:t> </a:t>
+            </a:r>
+            <a:r>
+              <a:rPr lang="en-US" sz="1100" dirty="0" err="1"/>
+              <a:t>là</a:t>
+            </a:r>
+            <a:r>
+              <a:rPr lang="en-US" sz="1100" dirty="0"/>
+              <a:t> </a:t>
+            </a:r>
+            <a:r>
+              <a:rPr lang="en-US" sz="1100" dirty="0" err="1"/>
+              <a:t>index.tsx</a:t>
+            </a:r>
+            <a:r>
+              <a:rPr lang="en-US" sz="1100" dirty="0"/>
+              <a:t>, </a:t>
+            </a:r>
+            <a:r>
+              <a:rPr lang="en-US" sz="1100" dirty="0" err="1"/>
+              <a:t>hoặc</a:t>
+            </a:r>
+            <a:r>
+              <a:rPr lang="en-US" sz="1100" dirty="0"/>
+              <a:t> </a:t>
+            </a:r>
+            <a:r>
+              <a:rPr lang="en-US" sz="1100" dirty="0" err="1"/>
+              <a:t>thư</a:t>
+            </a:r>
+            <a:r>
+              <a:rPr lang="en-US" sz="1100" dirty="0"/>
+              <a:t> </a:t>
+            </a:r>
+            <a:r>
+              <a:rPr lang="en-US" sz="1100" dirty="0" err="1"/>
+              <a:t>mục</a:t>
+            </a:r>
+            <a:r>
+              <a:rPr lang="en-US" sz="1100" dirty="0"/>
+              <a:t> app </a:t>
+            </a:r>
+            <a:r>
+              <a:rPr lang="en-US" sz="1100" dirty="0" err="1"/>
+              <a:t>sẽ</a:t>
+            </a:r>
+            <a:r>
+              <a:rPr lang="en-US" sz="1100" dirty="0"/>
+              <a:t> </a:t>
+            </a:r>
+            <a:r>
+              <a:rPr lang="en-US" sz="1100" dirty="0" err="1"/>
+              <a:t>là</a:t>
+            </a:r>
+            <a:r>
+              <a:rPr lang="en-US" sz="1100" dirty="0"/>
+              <a:t> </a:t>
+            </a:r>
+            <a:r>
+              <a:rPr lang="en-US" sz="1100" dirty="0" err="1"/>
+              <a:t>page.tsx</a:t>
+            </a:r>
+            <a:endParaRPr lang="en-US" dirty="0"/>
+          </a:p>
+        </p:txBody>
+      </p:sp>
+    </p:spTree>
+    <p:extLst>
+      <p:ext uri="{BB962C8B-B14F-4D97-AF65-F5344CB8AC3E}">
+        <p14:creationId xmlns:p14="http://schemas.microsoft.com/office/powerpoint/2010/main" val="2413052471"/>
+      </p:ext>
+    </p:extLst>
+  </p:cSld>
+  <p:clrMapOvr>
+    <a:masterClrMapping/>
+  </p:clrMapOvr>
+</p:notes>
+</file>
+
+<file path=ppt/notesSlides/notesSlide26.xml><?xml version="1.0" encoding="utf-8"?>
+<p:notes xmlns:a="http://schemas.openxmlformats.org/drawingml/2006/main" xmlns:r="http://schemas.openxmlformats.org/officeDocument/2006/relationships" xmlns:p="http://schemas.openxmlformats.org/presentationml/2006/main">
+  <p:cSld>
+    <p:spTree>
+      <p:nvGrpSpPr>
+        <p:cNvPr id="1" name=""/>
+        <p:cNvGrpSpPr/>
+        <p:nvPr/>
+      </p:nvGrpSpPr>
+      <p:grpSpPr>
+        <a:xfrm>
+          <a:off x="0" y="0"/>
+          <a:ext cx="0" cy="0"/>
+          <a:chOff x="0" y="0"/>
+          <a:chExt cx="0" cy="0"/>
+        </a:xfrm>
+      </p:grpSpPr>
+      <p:sp>
+        <p:nvSpPr>
+          <p:cNvPr id="2" name="Slide Image Placeholder 1"/>
+          <p:cNvSpPr>
+            <a:spLocks noGrp="1" noRot="1" noChangeAspect="1"/>
+          </p:cNvSpPr>
+          <p:nvPr>
+            <p:ph type="sldImg"/>
+          </p:nvPr>
+        </p:nvSpPr>
         <p:spPr/>
       </p:sp>
       <p:sp>
@@ -4883,7 +5070,7 @@
 </p:notes>
 </file>
 
-<file path=ppt/notesSlides/notesSlide26.xml><?xml version="1.0" encoding="utf-8"?>
+<file path=ppt/notesSlides/notesSlide27.xml><?xml version="1.0" encoding="utf-8"?>
 <p:notes xmlns:a="http://schemas.openxmlformats.org/drawingml/2006/main" xmlns:r="http://schemas.openxmlformats.org/officeDocument/2006/relationships" xmlns:p="http://schemas.openxmlformats.org/presentationml/2006/main" showMasterSp="0" showMasterPhAnim="0">
   <p:cSld>
     <p:spTree>
@@ -4987,7 +5174,7 @@
 </p:notes>
 </file>
 
-<file path=ppt/notesSlides/notesSlide27.xml><?xml version="1.0" encoding="utf-8"?>
+<file path=ppt/notesSlides/notesSlide28.xml><?xml version="1.0" encoding="utf-8"?>
 <p:notes xmlns:a="http://schemas.openxmlformats.org/drawingml/2006/main" xmlns:r="http://schemas.openxmlformats.org/officeDocument/2006/relationships" xmlns:p="http://schemas.openxmlformats.org/presentationml/2006/main" showMasterSp="0" showMasterPhAnim="0">
   <p:cSld>
     <p:spTree>
@@ -5091,7 +5278,7 @@
 </p:notes>
 </file>
 
-<file path=ppt/notesSlides/notesSlide28.xml><?xml version="1.0" encoding="utf-8"?>
+<file path=ppt/notesSlides/notesSlide29.xml><?xml version="1.0" encoding="utf-8"?>
 <p:notes xmlns:a="http://schemas.openxmlformats.org/drawingml/2006/main" xmlns:r="http://schemas.openxmlformats.org/officeDocument/2006/relationships" xmlns:p="http://schemas.openxmlformats.org/presentationml/2006/main" showMasterSp="0" showMasterPhAnim="0">
   <p:cSld>
     <p:spTree>
@@ -19082,13 +19269,58 @@
           <a:p>
             <a:r>
               <a:rPr lang="vi-VN" sz="1800" dirty="0"/>
-              <a:t>Next.js cung cấp một cơ chế định tuyến dựa trên thư mục và tên file đơn giản. Mỗi file trong thư mục pages tương ứng với một route trên ứng dụng của bạn.</a:t>
-            </a:r>
+              <a:t>Next.js cung cấp một cơ chế định tuyến dựa trên thư mục và tên file đơn giản. Mỗi file trong thư mục pages</a:t>
+            </a:r>
+            <a:r>
+              <a:rPr lang="en-US" sz="1800" dirty="0"/>
+              <a:t> </a:t>
+            </a:r>
+            <a:r>
+              <a:rPr lang="en-US" sz="1800" dirty="0" err="1"/>
+              <a:t>hoặc</a:t>
+            </a:r>
+            <a:r>
+              <a:rPr lang="en-US" sz="1800"/>
+              <a:t> app</a:t>
+            </a:r>
+            <a:r>
+              <a:rPr lang="vi-VN" sz="1800"/>
+              <a:t> </a:t>
+            </a:r>
+            <a:r>
+              <a:rPr lang="vi-VN" sz="1800" dirty="0"/>
+              <a:t>tương ứng với một route trên ứng dụng.</a:t>
+            </a:r>
+            <a:r>
+              <a:rPr lang="en-US" sz="1800" dirty="0"/>
+              <a:t> </a:t>
+            </a:r>
+            <a:endParaRPr lang="vi-VN" sz="1800" dirty="0"/>
           </a:p>
           <a:p>
             <a:r>
+              <a:rPr lang="en-US" sz="1800" dirty="0" err="1"/>
+              <a:t>Có</a:t>
+            </a:r>
+            <a:r>
+              <a:rPr lang="en-US" sz="1800" dirty="0"/>
+              <a:t> </a:t>
+            </a:r>
+            <a:r>
+              <a:rPr lang="en-US" sz="1800" dirty="0" err="1"/>
+              <a:t>thể</a:t>
+            </a:r>
+            <a:r>
               <a:rPr lang="vi-VN" sz="1800" dirty="0"/>
-              <a:t>Bạn có thể tạo các thư mục con trong thư mục pages để tạo ra các route lồng nhau. Ví dụ: pages/about/index.js sẽ tạo ra route /about.</a:t>
+              <a:t> thư mục con trong thư mục pages để tạo ra các route lồng nhau. Ví dụ: pages/about/index.</a:t>
+            </a:r>
+            <a:r>
+              <a:rPr lang="en-US" sz="1800" dirty="0" err="1"/>
+              <a:t>tsx</a:t>
+            </a:r>
+            <a:r>
+              <a:rPr lang="vi-VN" sz="1800" dirty="0"/>
+              <a:t> sẽ tạo ra route /about.</a:t>
             </a:r>
             <a:endParaRPr lang="en-US" sz="1800" dirty="0"/>
           </a:p>

</xml_diff>